<commit_message>
update ppt et nettoyage
</commit_message>
<xml_diff>
--- a/GuessNetwork.pptx
+++ b/GuessNetwork.pptx
@@ -5,12 +5,14 @@
     <p:sldMasterId id="2147483648" r:id="rId1"/>
   </p:sldMasterIdLst>
   <p:notesMasterIdLst>
-    <p:notesMasterId r:id="rId5"/>
+    <p:notesMasterId r:id="rId7"/>
   </p:notesMasterIdLst>
   <p:sldIdLst>
     <p:sldId id="256" r:id="rId2"/>
     <p:sldId id="257" r:id="rId3"/>
-    <p:sldId id="258" r:id="rId4"/>
+    <p:sldId id="260" r:id="rId4"/>
+    <p:sldId id="258" r:id="rId5"/>
+    <p:sldId id="259" r:id="rId6"/>
   </p:sldIdLst>
   <p:sldSz cx="12192000" cy="6858000"/>
   <p:notesSz cx="6858000" cy="9144000"/>
@@ -109,6 +111,11 @@
       </a:defRPr>
     </a:lvl9pPr>
   </p:defaultTextStyle>
+  <p:extLst>
+    <p:ext uri="{EFAFB233-063F-42B5-8137-9DF3F51BA10A}">
+      <p15:sldGuideLst xmlns:p15="http://schemas.microsoft.com/office/powerpoint/2012/main"/>
+    </p:ext>
+  </p:extLst>
 </p:presentation>
 </file>
 
@@ -194,7 +201,7 @@
           <a:p>
             <a:fld id="{4F86EE6D-9023-4A74-BFC4-5CA65C5428A3}" type="datetimeFigureOut">
               <a:rPr lang="fr-FR" smtClean="0"/>
-              <a:t>28/03/2023</a:t>
+              <a:t>31/03/2023</a:t>
             </a:fld>
             <a:endParaRPr lang="fr-FR"/>
           </a:p>
@@ -608,7 +615,7 @@
           <a:p>
             <a:fld id="{93DC8BB0-A12D-4EE3-9B89-D93185997255}" type="datetime1">
               <a:rPr lang="fr-FR" smtClean="0"/>
-              <a:t>28/03/2023</a:t>
+              <a:t>31/03/2023</a:t>
             </a:fld>
             <a:endParaRPr lang="fr-FR"/>
           </a:p>
@@ -806,7 +813,7 @@
           <a:p>
             <a:fld id="{AE1C208C-9F84-49B2-B0EB-2A177582DEE8}" type="datetime1">
               <a:rPr lang="fr-FR" smtClean="0"/>
-              <a:t>28/03/2023</a:t>
+              <a:t>31/03/2023</a:t>
             </a:fld>
             <a:endParaRPr lang="fr-FR"/>
           </a:p>
@@ -1014,7 +1021,7 @@
           <a:p>
             <a:fld id="{4995105D-4195-4D29-8CE2-D56EE5EB7116}" type="datetime1">
               <a:rPr lang="fr-FR" smtClean="0"/>
-              <a:t>28/03/2023</a:t>
+              <a:t>31/03/2023</a:t>
             </a:fld>
             <a:endParaRPr lang="fr-FR"/>
           </a:p>
@@ -1212,7 +1219,7 @@
           <a:p>
             <a:fld id="{FD6B2950-7B6B-46C6-83B2-C5398464D096}" type="datetime1">
               <a:rPr lang="fr-FR" smtClean="0"/>
-              <a:t>28/03/2023</a:t>
+              <a:t>31/03/2023</a:t>
             </a:fld>
             <a:endParaRPr lang="fr-FR"/>
           </a:p>
@@ -1487,7 +1494,7 @@
           <a:p>
             <a:fld id="{6528AFC8-A182-4CF3-97DF-3BD95E54DDBB}" type="datetime1">
               <a:rPr lang="fr-FR" smtClean="0"/>
-              <a:t>28/03/2023</a:t>
+              <a:t>31/03/2023</a:t>
             </a:fld>
             <a:endParaRPr lang="fr-FR"/>
           </a:p>
@@ -1752,7 +1759,7 @@
           <a:p>
             <a:fld id="{F19045D8-891E-4ECB-BF93-A18FBAB2FBA7}" type="datetime1">
               <a:rPr lang="fr-FR" smtClean="0"/>
-              <a:t>28/03/2023</a:t>
+              <a:t>31/03/2023</a:t>
             </a:fld>
             <a:endParaRPr lang="fr-FR"/>
           </a:p>
@@ -2164,7 +2171,7 @@
           <a:p>
             <a:fld id="{B70B3964-65D6-40C0-BC98-B5A4148DA7D8}" type="datetime1">
               <a:rPr lang="fr-FR" smtClean="0"/>
-              <a:t>28/03/2023</a:t>
+              <a:t>31/03/2023</a:t>
             </a:fld>
             <a:endParaRPr lang="fr-FR"/>
           </a:p>
@@ -2305,7 +2312,7 @@
           <a:p>
             <a:fld id="{038C2EA5-3329-4EFB-AC24-5147E8E01E8E}" type="datetime1">
               <a:rPr lang="fr-FR" smtClean="0"/>
-              <a:t>28/03/2023</a:t>
+              <a:t>31/03/2023</a:t>
             </a:fld>
             <a:endParaRPr lang="fr-FR"/>
           </a:p>
@@ -2418,7 +2425,7 @@
           <a:p>
             <a:fld id="{C0D9E01D-25FF-47FF-AC4D-78A20759FCC4}" type="datetime1">
               <a:rPr lang="fr-FR" smtClean="0"/>
-              <a:t>28/03/2023</a:t>
+              <a:t>31/03/2023</a:t>
             </a:fld>
             <a:endParaRPr lang="fr-FR"/>
           </a:p>
@@ -2729,7 +2736,7 @@
           <a:p>
             <a:fld id="{CCECF6AA-2F60-4114-9444-1D59B9D5E3A6}" type="datetime1">
               <a:rPr lang="fr-FR" smtClean="0"/>
-              <a:t>28/03/2023</a:t>
+              <a:t>31/03/2023</a:t>
             </a:fld>
             <a:endParaRPr lang="fr-FR"/>
           </a:p>
@@ -3017,7 +3024,7 @@
           <a:p>
             <a:fld id="{BCDBA29B-CE4D-44BA-A108-E915E024A836}" type="datetime1">
               <a:rPr lang="fr-FR" smtClean="0"/>
-              <a:t>28/03/2023</a:t>
+              <a:t>31/03/2023</a:t>
             </a:fld>
             <a:endParaRPr lang="fr-FR"/>
           </a:p>
@@ -3258,7 +3265,7 @@
           <a:p>
             <a:fld id="{FC42347E-1CC9-4E7B-8EAE-F537E0941004}" type="datetime1">
               <a:rPr lang="fr-FR" smtClean="0"/>
-              <a:t>28/03/2023</a:t>
+              <a:t>31/03/2023</a:t>
             </a:fld>
             <a:endParaRPr lang="fr-FR"/>
           </a:p>
@@ -5765,7 +5772,7 @@
             <a:pPr algn="ctr"/>
             <a:r>
               <a:rPr lang="fr-FR" dirty="0"/>
-              <a:t>FONCTIONNEMENT</a:t>
+              <a:t>L’ALGORITHME</a:t>
             </a:r>
           </a:p>
         </p:txBody>
@@ -5799,10 +5806,611 @@
           </a:p>
         </p:txBody>
       </p:sp>
+      <p:sp>
+        <p:nvSpPr>
+          <p:cNvPr id="4" name="ZoneTexte 3">
+            <a:extLst>
+              <a:ext uri="{FF2B5EF4-FFF2-40B4-BE49-F238E27FC236}">
+                <a16:creationId xmlns:a16="http://schemas.microsoft.com/office/drawing/2014/main" id="{B402B9C8-1655-6558-CAF7-5243ADF59396}"/>
+              </a:ext>
+            </a:extLst>
+          </p:cNvPr>
+          <p:cNvSpPr txBox="1"/>
+          <p:nvPr/>
+        </p:nvSpPr>
+        <p:spPr>
+          <a:xfrm>
+            <a:off x="924560" y="1595120"/>
+            <a:ext cx="10302240" cy="3139321"/>
+          </a:xfrm>
+          <a:prstGeom prst="rect">
+            <a:avLst/>
+          </a:prstGeom>
+          <a:noFill/>
+        </p:spPr>
+        <p:txBody>
+          <a:bodyPr wrap="square" rtlCol="0">
+            <a:spAutoFit/>
+          </a:bodyPr>
+          <a:lstStyle/>
+          <a:p>
+            <a:pPr marL="285750" indent="-285750">
+              <a:buFont typeface="Arial" panose="020B0604020202020204" pitchFamily="34" charset="0"/>
+              <a:buChar char="•"/>
+            </a:pPr>
+            <a:r>
+              <a:rPr lang="fr-FR" dirty="0"/>
+              <a:t>Lorsque le client se connecte au serveur il doit initier le jeu en saisissant « </a:t>
+            </a:r>
+            <a:r>
+              <a:rPr lang="fr-FR" dirty="0" err="1"/>
+              <a:t>begin</a:t>
+            </a:r>
+            <a:r>
+              <a:rPr lang="fr-FR" dirty="0"/>
+              <a:t>» dans le cas contraire le serveur lui demande de le faire.</a:t>
+            </a:r>
+          </a:p>
+          <a:p>
+            <a:pPr marL="285750" indent="-285750">
+              <a:buFont typeface="Arial" panose="020B0604020202020204" pitchFamily="34" charset="0"/>
+              <a:buChar char="•"/>
+            </a:pPr>
+            <a:r>
+              <a:rPr lang="fr-FR" dirty="0"/>
+              <a:t>Le serveur demande ensuite de saisir «oui» après réception du « </a:t>
+            </a:r>
+            <a:r>
+              <a:rPr lang="fr-FR" dirty="0" err="1"/>
+              <a:t>begin</a:t>
+            </a:r>
+            <a:r>
+              <a:rPr lang="fr-FR" dirty="0"/>
+              <a:t>» qui servira d’acquittement afin d’initier le jeu.</a:t>
+            </a:r>
+          </a:p>
+          <a:p>
+            <a:pPr marL="285750" indent="-285750">
+              <a:buFont typeface="Arial" panose="020B0604020202020204" pitchFamily="34" charset="0"/>
+              <a:buChar char="•"/>
+            </a:pPr>
+            <a:r>
+              <a:rPr lang="fr-FR" dirty="0"/>
+              <a:t>Le serveur renvoie une question aléatoire après réception du oui.</a:t>
+            </a:r>
+          </a:p>
+          <a:p>
+            <a:pPr marL="285750" indent="-285750">
+              <a:buFont typeface="Arial" panose="020B0604020202020204" pitchFamily="34" charset="0"/>
+              <a:buChar char="•"/>
+            </a:pPr>
+            <a:r>
+              <a:rPr lang="fr-FR" dirty="0"/>
+              <a:t>Le client à 3 chances de trouver la bonne réponse sinon la connexion et interrompu.</a:t>
+            </a:r>
+          </a:p>
+          <a:p>
+            <a:pPr marL="285750" indent="-285750">
+              <a:buFont typeface="Arial" panose="020B0604020202020204" pitchFamily="34" charset="0"/>
+              <a:buChar char="•"/>
+            </a:pPr>
+            <a:r>
+              <a:rPr lang="fr-FR" dirty="0"/>
+              <a:t>Le client répond juste le serveur le félicite et lui laisse le choix de continuer ou de quitter en entrant «continuer » ou «quitter».</a:t>
+            </a:r>
+          </a:p>
+          <a:p>
+            <a:pPr marL="285750" indent="-285750">
+              <a:buFont typeface="Arial" panose="020B0604020202020204" pitchFamily="34" charset="0"/>
+              <a:buChar char="•"/>
+            </a:pPr>
+            <a:r>
+              <a:rPr lang="fr-FR" dirty="0"/>
+              <a:t>Si le client décide de continuer le serveur demande un nouvel acquittement, le client doit donc entrer «oui»</a:t>
+            </a:r>
+          </a:p>
+          <a:p>
+            <a:pPr marL="285750" indent="-285750">
+              <a:buFont typeface="Arial" panose="020B0604020202020204" pitchFamily="34" charset="0"/>
+              <a:buChar char="•"/>
+            </a:pPr>
+            <a:r>
+              <a:rPr lang="fr-FR" dirty="0"/>
+              <a:t>Si le client choisi de quitter on termine la connexion.</a:t>
+            </a:r>
+          </a:p>
+        </p:txBody>
+      </p:sp>
+    </p:spTree>
+    <p:extLst>
+      <p:ext uri="{BB962C8B-B14F-4D97-AF65-F5344CB8AC3E}">
+        <p14:creationId xmlns:p14="http://schemas.microsoft.com/office/powerpoint/2010/main" val="3463303873"/>
+      </p:ext>
+    </p:extLst>
+  </p:cSld>
+  <p:clrMapOvr>
+    <a:masterClrMapping/>
+  </p:clrMapOvr>
+</p:sld>
+</file>
+
+<file path=ppt/slides/slide4.xml><?xml version="1.0" encoding="utf-8"?>
+<p:sld xmlns:a="http://schemas.openxmlformats.org/drawingml/2006/main" xmlns:r="http://schemas.openxmlformats.org/officeDocument/2006/relationships" xmlns:p="http://schemas.openxmlformats.org/presentationml/2006/main">
+  <p:cSld>
+    <p:spTree>
+      <p:nvGrpSpPr>
+        <p:cNvPr id="1" name=""/>
+        <p:cNvGrpSpPr/>
+        <p:nvPr/>
+      </p:nvGrpSpPr>
+      <p:grpSpPr>
+        <a:xfrm>
+          <a:off x="0" y="0"/>
+          <a:ext cx="0" cy="0"/>
+          <a:chOff x="0" y="0"/>
+          <a:chExt cx="0" cy="0"/>
+        </a:xfrm>
+      </p:grpSpPr>
+      <p:sp>
+        <p:nvSpPr>
+          <p:cNvPr id="2" name="Titre 1">
+            <a:extLst>
+              <a:ext uri="{FF2B5EF4-FFF2-40B4-BE49-F238E27FC236}">
+                <a16:creationId xmlns:a16="http://schemas.microsoft.com/office/drawing/2014/main" id="{828EB6B9-365B-565F-D544-DC7E9C8BB43B}"/>
+              </a:ext>
+            </a:extLst>
+          </p:cNvPr>
+          <p:cNvSpPr>
+            <a:spLocks noGrp="1"/>
+          </p:cNvSpPr>
+          <p:nvPr>
+            <p:ph type="title"/>
+          </p:nvPr>
+        </p:nvSpPr>
+        <p:spPr/>
+        <p:txBody>
+          <a:bodyPr/>
+          <a:lstStyle/>
+          <a:p>
+            <a:pPr algn="ctr"/>
+            <a:r>
+              <a:rPr lang="fr-FR" dirty="0"/>
+              <a:t>FONCTIONNEMENT</a:t>
+            </a:r>
+          </a:p>
+        </p:txBody>
+      </p:sp>
+      <p:sp>
+        <p:nvSpPr>
+          <p:cNvPr id="3" name="Espace réservé du numéro de diapositive 2">
+            <a:extLst>
+              <a:ext uri="{FF2B5EF4-FFF2-40B4-BE49-F238E27FC236}">
+                <a16:creationId xmlns:a16="http://schemas.microsoft.com/office/drawing/2014/main" id="{5BA914D3-4BAF-8035-0A30-11FAFE90EF1C}"/>
+              </a:ext>
+            </a:extLst>
+          </p:cNvPr>
+          <p:cNvSpPr>
+            <a:spLocks noGrp="1"/>
+          </p:cNvSpPr>
+          <p:nvPr>
+            <p:ph type="sldNum" sz="quarter" idx="12"/>
+          </p:nvPr>
+        </p:nvSpPr>
+        <p:spPr/>
+        <p:txBody>
+          <a:bodyPr/>
+          <a:lstStyle/>
+          <a:p>
+            <a:fld id="{C87096AC-BC12-4E68-9BB1-00E05612A039}" type="slidenum">
+              <a:rPr lang="fr-FR" smtClean="0"/>
+              <a:t>4</a:t>
+            </a:fld>
+            <a:endParaRPr lang="fr-FR"/>
+          </a:p>
+        </p:txBody>
+      </p:sp>
     </p:spTree>
     <p:extLst>
       <p:ext uri="{BB962C8B-B14F-4D97-AF65-F5344CB8AC3E}">
         <p14:creationId xmlns:p14="http://schemas.microsoft.com/office/powerpoint/2010/main" val="1786831507"/>
+      </p:ext>
+    </p:extLst>
+  </p:cSld>
+  <p:clrMapOvr>
+    <a:masterClrMapping/>
+  </p:clrMapOvr>
+</p:sld>
+</file>
+
+<file path=ppt/slides/slide5.xml><?xml version="1.0" encoding="utf-8"?>
+<p:sld xmlns:a="http://schemas.openxmlformats.org/drawingml/2006/main" xmlns:r="http://schemas.openxmlformats.org/officeDocument/2006/relationships" xmlns:p="http://schemas.openxmlformats.org/presentationml/2006/main">
+  <p:cSld>
+    <p:spTree>
+      <p:nvGrpSpPr>
+        <p:cNvPr id="1" name=""/>
+        <p:cNvGrpSpPr/>
+        <p:nvPr/>
+      </p:nvGrpSpPr>
+      <p:grpSpPr>
+        <a:xfrm>
+          <a:off x="0" y="0"/>
+          <a:ext cx="0" cy="0"/>
+          <a:chOff x="0" y="0"/>
+          <a:chExt cx="0" cy="0"/>
+        </a:xfrm>
+      </p:grpSpPr>
+      <p:sp>
+        <p:nvSpPr>
+          <p:cNvPr id="2" name="Titre 1">
+            <a:extLst>
+              <a:ext uri="{FF2B5EF4-FFF2-40B4-BE49-F238E27FC236}">
+                <a16:creationId xmlns:a16="http://schemas.microsoft.com/office/drawing/2014/main" id="{828EB6B9-365B-565F-D544-DC7E9C8BB43B}"/>
+              </a:ext>
+            </a:extLst>
+          </p:cNvPr>
+          <p:cNvSpPr>
+            <a:spLocks noGrp="1"/>
+          </p:cNvSpPr>
+          <p:nvPr>
+            <p:ph type="title"/>
+          </p:nvPr>
+        </p:nvSpPr>
+        <p:spPr/>
+        <p:txBody>
+          <a:bodyPr/>
+          <a:lstStyle/>
+          <a:p>
+            <a:pPr algn="ctr"/>
+            <a:r>
+              <a:rPr lang="fr-FR" dirty="0"/>
+              <a:t>SCRIPT</a:t>
+            </a:r>
+          </a:p>
+        </p:txBody>
+      </p:sp>
+      <p:sp>
+        <p:nvSpPr>
+          <p:cNvPr id="3" name="Espace réservé du numéro de diapositive 2">
+            <a:extLst>
+              <a:ext uri="{FF2B5EF4-FFF2-40B4-BE49-F238E27FC236}">
+                <a16:creationId xmlns:a16="http://schemas.microsoft.com/office/drawing/2014/main" id="{5BA914D3-4BAF-8035-0A30-11FAFE90EF1C}"/>
+              </a:ext>
+            </a:extLst>
+          </p:cNvPr>
+          <p:cNvSpPr>
+            <a:spLocks noGrp="1"/>
+          </p:cNvSpPr>
+          <p:nvPr>
+            <p:ph type="sldNum" sz="quarter" idx="12"/>
+          </p:nvPr>
+        </p:nvSpPr>
+        <p:spPr/>
+        <p:txBody>
+          <a:bodyPr/>
+          <a:lstStyle/>
+          <a:p>
+            <a:fld id="{C87096AC-BC12-4E68-9BB1-00E05612A039}" type="slidenum">
+              <a:rPr lang="fr-FR" smtClean="0"/>
+              <a:t>5</a:t>
+            </a:fld>
+            <a:endParaRPr lang="fr-FR"/>
+          </a:p>
+        </p:txBody>
+      </p:sp>
+      <p:sp>
+        <p:nvSpPr>
+          <p:cNvPr id="4" name="ZoneTexte 3">
+            <a:extLst>
+              <a:ext uri="{FF2B5EF4-FFF2-40B4-BE49-F238E27FC236}">
+                <a16:creationId xmlns:a16="http://schemas.microsoft.com/office/drawing/2014/main" id="{B402B9C8-1655-6558-CAF7-5243ADF59396}"/>
+              </a:ext>
+            </a:extLst>
+          </p:cNvPr>
+          <p:cNvSpPr txBox="1"/>
+          <p:nvPr/>
+        </p:nvSpPr>
+        <p:spPr>
+          <a:xfrm>
+            <a:off x="924560" y="1595120"/>
+            <a:ext cx="10302240" cy="646331"/>
+          </a:xfrm>
+          <a:prstGeom prst="rect">
+            <a:avLst/>
+          </a:prstGeom>
+          <a:noFill/>
+        </p:spPr>
+        <p:txBody>
+          <a:bodyPr wrap="square" rtlCol="0">
+            <a:spAutoFit/>
+          </a:bodyPr>
+          <a:lstStyle/>
+          <a:p>
+            <a:r>
+              <a:rPr lang="fr-FR" dirty="0"/>
+              <a:t>Afin d’exécuter nos programmes client et serveur nous avons écrit 2 scripts contenant la lignes nécessaires a l’exécution des programmes.</a:t>
+            </a:r>
+          </a:p>
+        </p:txBody>
+      </p:sp>
+      <p:sp>
+        <p:nvSpPr>
+          <p:cNvPr id="5" name="ZoneTexte 4">
+            <a:extLst>
+              <a:ext uri="{FF2B5EF4-FFF2-40B4-BE49-F238E27FC236}">
+                <a16:creationId xmlns:a16="http://schemas.microsoft.com/office/drawing/2014/main" id="{CD2623EF-40C8-07D5-AF00-B0BF9225C4CA}"/>
+              </a:ext>
+            </a:extLst>
+          </p:cNvPr>
+          <p:cNvSpPr txBox="1"/>
+          <p:nvPr/>
+        </p:nvSpPr>
+        <p:spPr>
+          <a:xfrm>
+            <a:off x="1046480" y="2540000"/>
+            <a:ext cx="10180320" cy="2585323"/>
+          </a:xfrm>
+          <a:prstGeom prst="rect">
+            <a:avLst/>
+          </a:prstGeom>
+          <a:noFill/>
+        </p:spPr>
+        <p:txBody>
+          <a:bodyPr wrap="square" rtlCol="0">
+            <a:spAutoFit/>
+          </a:bodyPr>
+          <a:lstStyle/>
+          <a:p>
+            <a:r>
+              <a:rPr lang="fr-FR" i="1" dirty="0" err="1"/>
+              <a:t>script_serveur</a:t>
+            </a:r>
+            <a:r>
+              <a:rPr lang="fr-FR" i="1" dirty="0"/>
+              <a:t>:</a:t>
+            </a:r>
+          </a:p>
+          <a:p>
+            <a:pPr marL="285750" indent="-285750">
+              <a:buFont typeface="Wingdings" panose="05000000000000000000" pitchFamily="2" charset="2"/>
+              <a:buChar char="Ø"/>
+            </a:pPr>
+            <a:r>
+              <a:rPr lang="fr-FR" sz="1800" dirty="0" err="1">
+                <a:solidFill>
+                  <a:srgbClr val="000000"/>
+                </a:solidFill>
+                <a:highlight>
+                  <a:srgbClr val="FFFFFF"/>
+                </a:highlight>
+              </a:rPr>
+              <a:t>sudo</a:t>
+            </a:r>
+            <a:r>
+              <a:rPr lang="fr-FR" sz="1800" dirty="0">
+                <a:solidFill>
+                  <a:srgbClr val="000000"/>
+                </a:solidFill>
+                <a:highlight>
+                  <a:srgbClr val="FFFFFF"/>
+                </a:highlight>
+              </a:rPr>
+              <a:t> ./</a:t>
+            </a:r>
+            <a:r>
+              <a:rPr lang="fr-FR" sz="1800" dirty="0" err="1">
+                <a:solidFill>
+                  <a:srgbClr val="000000"/>
+                </a:solidFill>
+                <a:highlight>
+                  <a:srgbClr val="FFFFFF"/>
+                </a:highlight>
+              </a:rPr>
+              <a:t>serveur_UDP-LinuxMintGE</a:t>
+            </a:r>
+            <a:r>
+              <a:rPr lang="fr-FR" sz="1800" dirty="0">
+                <a:solidFill>
+                  <a:srgbClr val="000000"/>
+                </a:solidFill>
+                <a:highlight>
+                  <a:srgbClr val="FFFFFF"/>
+                </a:highlight>
+              </a:rPr>
+              <a:t> 1000</a:t>
+            </a:r>
+          </a:p>
+          <a:p>
+            <a:pPr marL="285750" indent="-285750">
+              <a:buFont typeface="Wingdings" panose="05000000000000000000" pitchFamily="2" charset="2"/>
+              <a:buChar char="Ø"/>
+            </a:pPr>
+            <a:endParaRPr lang="fr-FR" dirty="0">
+              <a:solidFill>
+                <a:srgbClr val="000000"/>
+              </a:solidFill>
+              <a:highlight>
+                <a:srgbClr val="FFFFFF"/>
+              </a:highlight>
+            </a:endParaRPr>
+          </a:p>
+          <a:p>
+            <a:r>
+              <a:rPr lang="fr-FR" i="1" dirty="0" err="1">
+                <a:solidFill>
+                  <a:srgbClr val="000000"/>
+                </a:solidFill>
+                <a:highlight>
+                  <a:srgbClr val="FFFFFF"/>
+                </a:highlight>
+              </a:rPr>
+              <a:t>script_client</a:t>
+            </a:r>
+            <a:r>
+              <a:rPr lang="fr-FR" i="1" dirty="0">
+                <a:solidFill>
+                  <a:srgbClr val="000000"/>
+                </a:solidFill>
+                <a:highlight>
+                  <a:srgbClr val="FFFFFF"/>
+                </a:highlight>
+              </a:rPr>
+              <a:t>:</a:t>
+            </a:r>
+          </a:p>
+          <a:p>
+            <a:pPr marL="285750" indent="-285750">
+              <a:buFont typeface="Wingdings" panose="05000000000000000000" pitchFamily="2" charset="2"/>
+              <a:buChar char="Ø"/>
+            </a:pPr>
+            <a:r>
+              <a:rPr lang="fr-FR" i="1" dirty="0" err="1">
+                <a:solidFill>
+                  <a:srgbClr val="000000"/>
+                </a:solidFill>
+                <a:highlight>
+                  <a:srgbClr val="FFFFFF"/>
+                </a:highlight>
+              </a:rPr>
+              <a:t>sudo</a:t>
+            </a:r>
+            <a:r>
+              <a:rPr lang="fr-FR" i="1" dirty="0">
+                <a:solidFill>
+                  <a:srgbClr val="000000"/>
+                </a:solidFill>
+                <a:highlight>
+                  <a:srgbClr val="FFFFFF"/>
+                </a:highlight>
+              </a:rPr>
+              <a:t> ./</a:t>
+            </a:r>
+            <a:r>
+              <a:rPr lang="fr-FR" i="1" dirty="0" err="1">
+                <a:solidFill>
+                  <a:srgbClr val="000000"/>
+                </a:solidFill>
+                <a:highlight>
+                  <a:srgbClr val="FFFFFF"/>
+                </a:highlight>
+              </a:rPr>
+              <a:t>client_UDP-LinuxMintGE</a:t>
+            </a:r>
+            <a:r>
+              <a:rPr lang="fr-FR" i="1" dirty="0">
+                <a:solidFill>
+                  <a:srgbClr val="000000"/>
+                </a:solidFill>
+                <a:highlight>
+                  <a:srgbClr val="FFFFFF"/>
+                </a:highlight>
+              </a:rPr>
+              <a:t> </a:t>
+            </a:r>
+            <a:r>
+              <a:rPr lang="fr-FR" i="1" dirty="0" err="1">
+                <a:solidFill>
+                  <a:srgbClr val="000000"/>
+                </a:solidFill>
+                <a:highlight>
+                  <a:srgbClr val="FFFFFF"/>
+                </a:highlight>
+              </a:rPr>
+              <a:t>LinuxMintGE</a:t>
+            </a:r>
+            <a:r>
+              <a:rPr lang="fr-FR" i="1" dirty="0">
+                <a:solidFill>
+                  <a:srgbClr val="000000"/>
+                </a:solidFill>
+                <a:highlight>
+                  <a:srgbClr val="FFFFFF"/>
+                </a:highlight>
+              </a:rPr>
+              <a:t> 1000</a:t>
+            </a:r>
+          </a:p>
+          <a:p>
+            <a:pPr marL="285750" indent="-285750">
+              <a:buFont typeface="Wingdings" panose="05000000000000000000" pitchFamily="2" charset="2"/>
+              <a:buChar char="Ø"/>
+            </a:pPr>
+            <a:endParaRPr lang="fr-FR" i="1" dirty="0">
+              <a:solidFill>
+                <a:srgbClr val="000000"/>
+              </a:solidFill>
+              <a:highlight>
+                <a:srgbClr val="FFFFFF"/>
+              </a:highlight>
+            </a:endParaRPr>
+          </a:p>
+          <a:p>
+            <a:endParaRPr lang="fr-FR" i="1" dirty="0">
+              <a:solidFill>
+                <a:srgbClr val="000000"/>
+              </a:solidFill>
+              <a:highlight>
+                <a:srgbClr val="FFFFFF"/>
+              </a:highlight>
+            </a:endParaRPr>
+          </a:p>
+          <a:p>
+            <a:pPr marL="285750" indent="-285750">
+              <a:buFont typeface="Wingdings" panose="05000000000000000000" pitchFamily="2" charset="2"/>
+              <a:buChar char="Ø"/>
+            </a:pPr>
+            <a:endParaRPr lang="fr-FR" dirty="0">
+              <a:solidFill>
+                <a:srgbClr val="000000"/>
+              </a:solidFill>
+              <a:highlight>
+                <a:srgbClr val="FFFFFF"/>
+              </a:highlight>
+            </a:endParaRPr>
+          </a:p>
+          <a:p>
+            <a:endParaRPr lang="fr-FR" dirty="0"/>
+          </a:p>
+        </p:txBody>
+      </p:sp>
+      <p:sp>
+        <p:nvSpPr>
+          <p:cNvPr id="6" name="ZoneTexte 5">
+            <a:extLst>
+              <a:ext uri="{FF2B5EF4-FFF2-40B4-BE49-F238E27FC236}">
+                <a16:creationId xmlns:a16="http://schemas.microsoft.com/office/drawing/2014/main" id="{E4FD0C4A-8A65-01F5-EA00-0F89E1ED4CD0}"/>
+              </a:ext>
+            </a:extLst>
+          </p:cNvPr>
+          <p:cNvSpPr txBox="1"/>
+          <p:nvPr/>
+        </p:nvSpPr>
+        <p:spPr>
+          <a:xfrm>
+            <a:off x="924560" y="4293384"/>
+            <a:ext cx="10302240" cy="369332"/>
+          </a:xfrm>
+          <a:prstGeom prst="rect">
+            <a:avLst/>
+          </a:prstGeom>
+          <a:noFill/>
+        </p:spPr>
+        <p:txBody>
+          <a:bodyPr wrap="square" rtlCol="0">
+            <a:spAutoFit/>
+          </a:bodyPr>
+          <a:lstStyle/>
+          <a:p>
+            <a:r>
+              <a:rPr lang="fr-FR" dirty="0"/>
+              <a:t>Cela nous permet d’exécuter le jeu en local.</a:t>
+            </a:r>
+          </a:p>
+        </p:txBody>
+      </p:sp>
+    </p:spTree>
+    <p:extLst>
+      <p:ext uri="{BB962C8B-B14F-4D97-AF65-F5344CB8AC3E}">
+        <p14:creationId xmlns:p14="http://schemas.microsoft.com/office/powerpoint/2010/main" val="3352987220"/>
       </p:ext>
     </p:extLst>
   </p:cSld>

</xml_diff>